<commit_message>
in class changes to 8-9
</commit_message>
<xml_diff>
--- a/Lectures/9_Object_Oriented_Programming.pptx
+++ b/Lectures/9_Object_Oriented_Programming.pptx
@@ -361,7 +361,7 @@
           <a:p>
             <a:fld id="{1D8BD707-D9CF-40AE-B4C6-C98DA3205C09}" type="datetimeFigureOut">
               <a:rPr lang="en-US"/>
-              <a:t>2/17/2025</a:t>
+              <a:t>2/19/2025</a:t>
             </a:fld>
             <a:endParaRPr lang="en-US"/>
           </a:p>
@@ -587,7 +587,7 @@
           <a:p>
             <a:fld id="{1D8BD707-D9CF-40AE-B4C6-C98DA3205C09}" type="datetimeFigureOut">
               <a:rPr lang="en-US"/>
-              <a:t>2/17/2025</a:t>
+              <a:t>2/19/2025</a:t>
             </a:fld>
             <a:endParaRPr lang="en-US"/>
           </a:p>
@@ -856,7 +856,7 @@
           <a:p>
             <a:fld id="{1D8BD707-D9CF-40AE-B4C6-C98DA3205C09}" type="datetimeFigureOut">
               <a:rPr lang="en-US"/>
-              <a:t>2/17/2025</a:t>
+              <a:t>2/19/2025</a:t>
             </a:fld>
             <a:endParaRPr lang="en-US"/>
           </a:p>
@@ -1053,7 +1053,7 @@
           <a:p>
             <a:fld id="{1D8BD707-D9CF-40AE-B4C6-C98DA3205C09}" type="datetimeFigureOut">
               <a:rPr lang="en-US"/>
-              <a:t>2/17/2025</a:t>
+              <a:t>2/19/2025</a:t>
             </a:fld>
             <a:endParaRPr lang="en-US"/>
           </a:p>
@@ -1221,7 +1221,7 @@
           <a:p>
             <a:fld id="{1D8BD707-D9CF-40AE-B4C6-C98DA3205C09}" type="datetimeFigureOut">
               <a:rPr lang="en-US"/>
-              <a:t>2/17/2025</a:t>
+              <a:t>2/19/2025</a:t>
             </a:fld>
             <a:endParaRPr lang="en-US"/>
           </a:p>
@@ -1495,7 +1495,7 @@
           <a:p>
             <a:fld id="{1D8BD707-D9CF-40AE-B4C6-C98DA3205C09}" type="datetimeFigureOut">
               <a:rPr lang="en-US"/>
-              <a:t>2/17/2025</a:t>
+              <a:t>2/19/2025</a:t>
             </a:fld>
             <a:endParaRPr lang="en-US"/>
           </a:p>
@@ -2906,7 +2906,7 @@
         <p:spPr>
           <a:xfrm>
             <a:off x="762000" y="2057400"/>
-            <a:ext cx="11620751" cy="3785652"/>
+            <a:ext cx="11620751" cy="4154984"/>
           </a:xfrm>
           <a:prstGeom prst="rect">
             <a:avLst/>
@@ -3063,6 +3063,32 @@
                 <a:cs typeface="FiraCode Nerd Font" panose="02000009000000000000" pitchFamily="50" charset="0"/>
               </a:rPr>
               <a:t>("Bark!");</a:t>
+            </a:r>
+          </a:p>
+          <a:p>
+            <a:r>
+              <a:rPr lang="en-US" sz="2400" dirty="0">
+                <a:latin typeface="FiraCode Nerd Font" panose="02000009000000000000" pitchFamily="50" charset="0"/>
+                <a:ea typeface="FiraCode Nerd Font" panose="02000009000000000000" pitchFamily="50" charset="0"/>
+                <a:cs typeface="FiraCode Nerd Font" panose="02000009000000000000" pitchFamily="50" charset="0"/>
+              </a:rPr>
+              <a:t>		</a:t>
+            </a:r>
+            <a:r>
+              <a:rPr lang="en-US" sz="2400" dirty="0" err="1">
+                <a:latin typeface="FiraCode Nerd Font" panose="02000009000000000000" pitchFamily="50" charset="0"/>
+                <a:ea typeface="FiraCode Nerd Font" panose="02000009000000000000" pitchFamily="50" charset="0"/>
+                <a:cs typeface="FiraCode Nerd Font" panose="02000009000000000000" pitchFamily="50" charset="0"/>
+              </a:rPr>
+              <a:t>super.makeSound</a:t>
+            </a:r>
+            <a:r>
+              <a:rPr lang="en-US" sz="2400" dirty="0">
+                <a:latin typeface="FiraCode Nerd Font" panose="02000009000000000000" pitchFamily="50" charset="0"/>
+                <a:ea typeface="FiraCode Nerd Font" panose="02000009000000000000" pitchFamily="50" charset="0"/>
+                <a:cs typeface="FiraCode Nerd Font" panose="02000009000000000000" pitchFamily="50" charset="0"/>
+              </a:rPr>
+              <a:t>();</a:t>
             </a:r>
           </a:p>
           <a:p>
@@ -34113,14 +34139,14 @@
           <p:nvPr>
             <p:extLst>
               <p:ext uri="{D42A27DB-BD31-4B8C-83A1-F6EECF244321}">
-                <p14:modId xmlns:p14="http://schemas.microsoft.com/office/powerpoint/2010/main" val="2436489340"/>
+                <p14:modId xmlns:p14="http://schemas.microsoft.com/office/powerpoint/2010/main" val="2476866773"/>
               </p:ext>
             </p:extLst>
           </p:nvPr>
         </p:nvGraphicFramePr>
         <p:xfrm>
           <a:off x="609600" y="1828800"/>
-          <a:ext cx="10058399" cy="3810000"/>
+          <a:ext cx="10058399" cy="3912198"/>
         </p:xfrm>
         <a:graphic>
           <a:graphicData uri="http://schemas.openxmlformats.org/drawingml/2006/table">
@@ -34317,7 +34343,7 @@
                     <a:lstStyle/>
                     <a:p>
                       <a:r>
-                        <a:rPr lang="en-US"/>
+                        <a:rPr lang="en-US" dirty="0"/>
                         <a:t>[a-z]</a:t>
                       </a:r>
                     </a:p>
@@ -34368,7 +34394,7 @@
                     <a:lstStyle/>
                     <a:p>
                       <a:r>
-                        <a:rPr lang="en-US"/>
+                        <a:rPr lang="en-US" dirty="0"/>
                         <a:t>[A-Z]</a:t>
                       </a:r>
                     </a:p>
@@ -34470,8 +34496,8 @@
                     <a:lstStyle/>
                     <a:p>
                       <a:r>
-                        <a:rPr lang="en-US"/>
-                        <a:t>[0-9]</a:t>
+                        <a:rPr lang="en-US" dirty="0"/>
+                        <a:t>[a-zA-Z0-9]</a:t>
                       </a:r>
                     </a:p>
                   </a:txBody>

</xml_diff>